<commit_message>
ISIS-2450 : staging changes to website
</commit_message>
<xml_diff>
--- a/content/docs/latest/starters/_attachments/simpleapp-modules-dependencies.pptx
+++ b/content/docs/latest/starters/_attachments/simpleapp-modules-dependencies.pptx
@@ -261,7 +261,7 @@
           <a:p>
             <a:fld id="{3159BD86-569B-442C-ABE1-0B002BE59BAD}" type="datetimeFigureOut">
               <a:rPr lang="en-GB" smtClean="0"/>
-              <a:t>29/01/2020</a:t>
+              <a:t>14/03/2021</a:t>
             </a:fld>
             <a:endParaRPr lang="en-GB"/>
           </a:p>
@@ -461,7 +461,7 @@
           <a:p>
             <a:fld id="{3159BD86-569B-442C-ABE1-0B002BE59BAD}" type="datetimeFigureOut">
               <a:rPr lang="en-GB" smtClean="0"/>
-              <a:t>29/01/2020</a:t>
+              <a:t>14/03/2021</a:t>
             </a:fld>
             <a:endParaRPr lang="en-GB"/>
           </a:p>
@@ -671,7 +671,7 @@
           <a:p>
             <a:fld id="{3159BD86-569B-442C-ABE1-0B002BE59BAD}" type="datetimeFigureOut">
               <a:rPr lang="en-GB" smtClean="0"/>
-              <a:t>29/01/2020</a:t>
+              <a:t>14/03/2021</a:t>
             </a:fld>
             <a:endParaRPr lang="en-GB"/>
           </a:p>
@@ -871,7 +871,7 @@
           <a:p>
             <a:fld id="{3159BD86-569B-442C-ABE1-0B002BE59BAD}" type="datetimeFigureOut">
               <a:rPr lang="en-GB" smtClean="0"/>
-              <a:t>29/01/2020</a:t>
+              <a:t>14/03/2021</a:t>
             </a:fld>
             <a:endParaRPr lang="en-GB"/>
           </a:p>
@@ -1147,7 +1147,7 @@
           <a:p>
             <a:fld id="{3159BD86-569B-442C-ABE1-0B002BE59BAD}" type="datetimeFigureOut">
               <a:rPr lang="en-GB" smtClean="0"/>
-              <a:t>29/01/2020</a:t>
+              <a:t>14/03/2021</a:t>
             </a:fld>
             <a:endParaRPr lang="en-GB"/>
           </a:p>
@@ -1415,7 +1415,7 @@
           <a:p>
             <a:fld id="{3159BD86-569B-442C-ABE1-0B002BE59BAD}" type="datetimeFigureOut">
               <a:rPr lang="en-GB" smtClean="0"/>
-              <a:t>29/01/2020</a:t>
+              <a:t>14/03/2021</a:t>
             </a:fld>
             <a:endParaRPr lang="en-GB"/>
           </a:p>
@@ -1830,7 +1830,7 @@
           <a:p>
             <a:fld id="{3159BD86-569B-442C-ABE1-0B002BE59BAD}" type="datetimeFigureOut">
               <a:rPr lang="en-GB" smtClean="0"/>
-              <a:t>29/01/2020</a:t>
+              <a:t>14/03/2021</a:t>
             </a:fld>
             <a:endParaRPr lang="en-GB"/>
           </a:p>
@@ -1972,7 +1972,7 @@
           <a:p>
             <a:fld id="{3159BD86-569B-442C-ABE1-0B002BE59BAD}" type="datetimeFigureOut">
               <a:rPr lang="en-GB" smtClean="0"/>
-              <a:t>29/01/2020</a:t>
+              <a:t>14/03/2021</a:t>
             </a:fld>
             <a:endParaRPr lang="en-GB"/>
           </a:p>
@@ -2085,7 +2085,7 @@
           <a:p>
             <a:fld id="{3159BD86-569B-442C-ABE1-0B002BE59BAD}" type="datetimeFigureOut">
               <a:rPr lang="en-GB" smtClean="0"/>
-              <a:t>29/01/2020</a:t>
+              <a:t>14/03/2021</a:t>
             </a:fld>
             <a:endParaRPr lang="en-GB"/>
           </a:p>
@@ -2398,7 +2398,7 @@
           <a:p>
             <a:fld id="{3159BD86-569B-442C-ABE1-0B002BE59BAD}" type="datetimeFigureOut">
               <a:rPr lang="en-GB" smtClean="0"/>
-              <a:t>29/01/2020</a:t>
+              <a:t>14/03/2021</a:t>
             </a:fld>
             <a:endParaRPr lang="en-GB"/>
           </a:p>
@@ -2687,7 +2687,7 @@
           <a:p>
             <a:fld id="{3159BD86-569B-442C-ABE1-0B002BE59BAD}" type="datetimeFigureOut">
               <a:rPr lang="en-GB" smtClean="0"/>
-              <a:t>29/01/2020</a:t>
+              <a:t>14/03/2021</a:t>
             </a:fld>
             <a:endParaRPr lang="en-GB"/>
           </a:p>
@@ -2930,7 +2930,7 @@
           <a:p>
             <a:fld id="{3159BD86-569B-442C-ABE1-0B002BE59BAD}" type="datetimeFigureOut">
               <a:rPr lang="en-GB" smtClean="0"/>
-              <a:t>29/01/2020</a:t>
+              <a:t>14/03/2021</a:t>
             </a:fld>
             <a:endParaRPr lang="en-GB"/>
           </a:p>
@@ -3349,10 +3349,10 @@
       </p:grpSpPr>
       <p:sp>
         <p:nvSpPr>
-          <p:cNvPr id="212" name="Rectangle 211">
-            <a:extLst>
-              <a:ext uri="{FF2B5EF4-FFF2-40B4-BE49-F238E27FC236}">
-                <a16:creationId xmlns:a16="http://schemas.microsoft.com/office/drawing/2014/main" id="{A8925A34-3BA1-4674-BCB5-C21486C74D4B}"/>
+          <p:cNvPr id="77" name="Rectangle 76">
+            <a:extLst>
+              <a:ext uri="{FF2B5EF4-FFF2-40B4-BE49-F238E27FC236}">
+                <a16:creationId xmlns:a16="http://schemas.microsoft.com/office/drawing/2014/main" id="{88199CD1-CDB7-42ED-9703-7E46E7989C7B}"/>
               </a:ext>
             </a:extLst>
           </p:cNvPr>
@@ -3361,8 +3361,8 @@
         </p:nvSpPr>
         <p:spPr>
           <a:xfrm>
-            <a:off x="8462564" y="1027961"/>
-            <a:ext cx="2511882" cy="2770094"/>
+            <a:off x="9665424" y="4567827"/>
+            <a:ext cx="2411187" cy="1511859"/>
           </a:xfrm>
           <a:prstGeom prst="rect">
             <a:avLst/>
@@ -3407,10 +3407,10 @@
       </p:sp>
       <p:sp>
         <p:nvSpPr>
-          <p:cNvPr id="211" name="Rectangle 210">
-            <a:extLst>
-              <a:ext uri="{FF2B5EF4-FFF2-40B4-BE49-F238E27FC236}">
-                <a16:creationId xmlns:a16="http://schemas.microsoft.com/office/drawing/2014/main" id="{D7BDD688-4E0D-4C5C-9B91-5EFB45393F65}"/>
+          <p:cNvPr id="72" name="Rectangle 71">
+            <a:extLst>
+              <a:ext uri="{FF2B5EF4-FFF2-40B4-BE49-F238E27FC236}">
+                <a16:creationId xmlns:a16="http://schemas.microsoft.com/office/drawing/2014/main" id="{3DDB6BC3-BAA6-49BF-8742-0D0F5EFDFC3B}"/>
               </a:ext>
             </a:extLst>
           </p:cNvPr>
@@ -3419,8 +3419,8 @@
         </p:nvSpPr>
         <p:spPr>
           <a:xfrm>
-            <a:off x="4930243" y="2134653"/>
-            <a:ext cx="2550171" cy="4501033"/>
+            <a:off x="4826292" y="454817"/>
+            <a:ext cx="2460205" cy="770900"/>
           </a:xfrm>
           <a:prstGeom prst="rect">
             <a:avLst/>
@@ -3465,10 +3465,10 @@
       </p:sp>
       <p:sp>
         <p:nvSpPr>
-          <p:cNvPr id="133" name="Rectangle 132">
-            <a:extLst>
-              <a:ext uri="{FF2B5EF4-FFF2-40B4-BE49-F238E27FC236}">
-                <a16:creationId xmlns:a16="http://schemas.microsoft.com/office/drawing/2014/main" id="{CFB28331-C485-4A67-BEB6-61F55D45790D}"/>
+          <p:cNvPr id="212" name="Rectangle 211">
+            <a:extLst>
+              <a:ext uri="{FF2B5EF4-FFF2-40B4-BE49-F238E27FC236}">
+                <a16:creationId xmlns:a16="http://schemas.microsoft.com/office/drawing/2014/main" id="{A8925A34-3BA1-4674-BCB5-C21486C74D4B}"/>
               </a:ext>
             </a:extLst>
           </p:cNvPr>
@@ -3477,8 +3477,8 @@
         </p:nvSpPr>
         <p:spPr>
           <a:xfrm>
-            <a:off x="9641829" y="4817152"/>
-            <a:ext cx="2550171" cy="1981303"/>
+            <a:off x="2598429" y="2471089"/>
+            <a:ext cx="2511882" cy="1702860"/>
           </a:xfrm>
           <a:prstGeom prst="rect">
             <a:avLst/>
@@ -3513,6 +3513,122 @@
           </a:fontRef>
         </p:style>
         <p:txBody>
+          <a:bodyPr rtlCol="0" anchor="ctr"/>
+          <a:lstStyle/>
+          <a:p>
+            <a:pPr algn="ctr"/>
+            <a:endParaRPr lang="en-GB" sz="1200" dirty="0"/>
+          </a:p>
+        </p:txBody>
+      </p:sp>
+      <p:sp>
+        <p:nvSpPr>
+          <p:cNvPr id="211" name="Rectangle 210">
+            <a:extLst>
+              <a:ext uri="{FF2B5EF4-FFF2-40B4-BE49-F238E27FC236}">
+                <a16:creationId xmlns:a16="http://schemas.microsoft.com/office/drawing/2014/main" id="{D7BDD688-4E0D-4C5C-9B91-5EFB45393F65}"/>
+              </a:ext>
+            </a:extLst>
+          </p:cNvPr>
+          <p:cNvSpPr/>
+          <p:nvPr/>
+        </p:nvSpPr>
+        <p:spPr>
+          <a:xfrm>
+            <a:off x="7791338" y="1442798"/>
+            <a:ext cx="2550171" cy="2661394"/>
+          </a:xfrm>
+          <a:prstGeom prst="rect">
+            <a:avLst/>
+          </a:prstGeom>
+          <a:solidFill>
+            <a:schemeClr val="bg1">
+              <a:lumMod val="95000"/>
+            </a:schemeClr>
+          </a:solidFill>
+          <a:ln>
+            <a:solidFill>
+              <a:schemeClr val="bg1">
+                <a:lumMod val="75000"/>
+              </a:schemeClr>
+            </a:solidFill>
+          </a:ln>
+        </p:spPr>
+        <p:style>
+          <a:lnRef idx="2">
+            <a:schemeClr val="accent3">
+              <a:shade val="50000"/>
+            </a:schemeClr>
+          </a:lnRef>
+          <a:fillRef idx="1">
+            <a:schemeClr val="accent3"/>
+          </a:fillRef>
+          <a:effectRef idx="0">
+            <a:schemeClr val="accent3"/>
+          </a:effectRef>
+          <a:fontRef idx="minor">
+            <a:schemeClr val="lt1"/>
+          </a:fontRef>
+        </p:style>
+        <p:txBody>
+          <a:bodyPr rtlCol="0" anchor="ctr"/>
+          <a:lstStyle/>
+          <a:p>
+            <a:pPr algn="ctr"/>
+            <a:endParaRPr lang="en-GB" sz="1200" dirty="0"/>
+          </a:p>
+        </p:txBody>
+      </p:sp>
+      <p:sp>
+        <p:nvSpPr>
+          <p:cNvPr id="133" name="Rectangle 132">
+            <a:extLst>
+              <a:ext uri="{FF2B5EF4-FFF2-40B4-BE49-F238E27FC236}">
+                <a16:creationId xmlns:a16="http://schemas.microsoft.com/office/drawing/2014/main" id="{CFB28331-C485-4A67-BEB6-61F55D45790D}"/>
+              </a:ext>
+            </a:extLst>
+          </p:cNvPr>
+          <p:cNvSpPr/>
+          <p:nvPr/>
+        </p:nvSpPr>
+        <p:spPr>
+          <a:xfrm>
+            <a:off x="115389" y="5369501"/>
+            <a:ext cx="3784138" cy="1372446"/>
+          </a:xfrm>
+          <a:prstGeom prst="rect">
+            <a:avLst/>
+          </a:prstGeom>
+          <a:solidFill>
+            <a:schemeClr val="bg1">
+              <a:lumMod val="95000"/>
+            </a:schemeClr>
+          </a:solidFill>
+          <a:ln>
+            <a:solidFill>
+              <a:schemeClr val="bg1">
+                <a:lumMod val="75000"/>
+              </a:schemeClr>
+            </a:solidFill>
+          </a:ln>
+        </p:spPr>
+        <p:style>
+          <a:lnRef idx="2">
+            <a:schemeClr val="accent3">
+              <a:shade val="50000"/>
+            </a:schemeClr>
+          </a:lnRef>
+          <a:fillRef idx="1">
+            <a:schemeClr val="accent3"/>
+          </a:fillRef>
+          <a:effectRef idx="0">
+            <a:schemeClr val="accent3"/>
+          </a:effectRef>
+          <a:fontRef idx="minor">
+            <a:schemeClr val="lt1"/>
+          </a:fontRef>
+        </p:style>
+        <p:txBody>
           <a:bodyPr rtlCol="0" anchor="t" anchorCtr="0"/>
           <a:lstStyle/>
           <a:p>
@@ -3550,7 +3666,7 @@
         </p:nvSpPr>
         <p:spPr>
           <a:xfrm>
-            <a:off x="5128772" y="5998314"/>
+            <a:off x="7990174" y="3461505"/>
             <a:ext cx="2220939" cy="486032"/>
           </a:xfrm>
           <a:prstGeom prst="rect">
@@ -3631,7 +3747,7 @@
         </p:nvSpPr>
         <p:spPr>
           <a:xfrm>
-            <a:off x="5128772" y="5096746"/>
+            <a:off x="7990174" y="2559937"/>
             <a:ext cx="2220939" cy="486032"/>
           </a:xfrm>
           <a:prstGeom prst="rect">
@@ -3683,7 +3799,7 @@
         </p:nvCxnSpPr>
         <p:spPr>
           <a:xfrm rot="5400000" flipH="1" flipV="1">
-            <a:off x="6031473" y="5790546"/>
+            <a:off x="8892875" y="3253737"/>
             <a:ext cx="415536" cy="12700"/>
           </a:xfrm>
           <a:prstGeom prst="curvedConnector3">
@@ -3724,7 +3840,7 @@
         </p:nvSpPr>
         <p:spPr>
           <a:xfrm>
-            <a:off x="214875" y="1175299"/>
+            <a:off x="214875" y="826763"/>
             <a:ext cx="1240231" cy="486032"/>
           </a:xfrm>
           <a:prstGeom prst="rect">
@@ -3787,8 +3903,8 @@
         </p:nvCxnSpPr>
         <p:spPr>
           <a:xfrm rot="10800000" flipV="1">
-            <a:off x="1455107" y="1409729"/>
-            <a:ext cx="392969" cy="8585"/>
+            <a:off x="1455106" y="875027"/>
+            <a:ext cx="392970" cy="194752"/>
           </a:xfrm>
           <a:prstGeom prst="curvedConnector3">
             <a:avLst>
@@ -3828,7 +3944,7 @@
         </p:nvSpPr>
         <p:spPr>
           <a:xfrm>
-            <a:off x="214875" y="3235095"/>
+            <a:off x="5250398" y="4381175"/>
             <a:ext cx="1240231" cy="486032"/>
           </a:xfrm>
           <a:prstGeom prst="rect">
@@ -3887,7 +4003,7 @@
         </p:nvSpPr>
         <p:spPr>
           <a:xfrm>
-            <a:off x="214875" y="1756087"/>
+            <a:off x="214875" y="1407551"/>
             <a:ext cx="1240231" cy="486032"/>
           </a:xfrm>
           <a:prstGeom prst="rect">
@@ -3943,7 +4059,7 @@
         </p:nvSpPr>
         <p:spPr>
           <a:xfrm>
-            <a:off x="214875" y="4766821"/>
+            <a:off x="5250398" y="4969414"/>
             <a:ext cx="1240231" cy="486032"/>
           </a:xfrm>
           <a:prstGeom prst="rect">
@@ -3996,7 +4112,7 @@
         </p:nvSpPr>
         <p:spPr>
           <a:xfrm>
-            <a:off x="214875" y="5366321"/>
+            <a:off x="5250398" y="5568914"/>
             <a:ext cx="1240231" cy="486032"/>
           </a:xfrm>
           <a:prstGeom prst="rect">
@@ -4052,20 +4168,18 @@
           </p:cNvPr>
           <p:cNvCxnSpPr>
             <a:cxnSpLocks/>
-            <a:stCxn id="5" idx="1"/>
+            <a:stCxn id="175" idx="0"/>
             <a:endCxn id="14" idx="3"/>
           </p:cNvCxnSpPr>
           <p:nvPr/>
         </p:nvCxnSpPr>
         <p:spPr>
-          <a:xfrm rot="10800000">
-            <a:off x="1455106" y="3478112"/>
-            <a:ext cx="3673666" cy="1861651"/>
-          </a:xfrm>
-          <a:prstGeom prst="curvedConnector3">
-            <a:avLst>
-              <a:gd name="adj1" fmla="val 50000"/>
-            </a:avLst>
+          <a:xfrm rot="16200000" flipV="1">
+            <a:off x="6452405" y="4662415"/>
+            <a:ext cx="493584" cy="417136"/>
+          </a:xfrm>
+          <a:prstGeom prst="curvedConnector2">
+            <a:avLst/>
           </a:prstGeom>
           <a:ln>
             <a:tailEnd type="triangle"/>
@@ -4098,14 +4212,14 @@
           <p:cNvCxnSpPr>
             <a:cxnSpLocks/>
             <a:stCxn id="5" idx="1"/>
-            <a:endCxn id="17" idx="3"/>
+            <a:endCxn id="175" idx="6"/>
           </p:cNvCxnSpPr>
           <p:nvPr/>
         </p:nvCxnSpPr>
         <p:spPr>
-          <a:xfrm rot="10800000">
-            <a:off x="1455106" y="5009838"/>
-            <a:ext cx="3673666" cy="329925"/>
+          <a:xfrm rot="10800000" flipV="1">
+            <a:off x="6979322" y="2802952"/>
+            <a:ext cx="1010852" cy="2409477"/>
           </a:xfrm>
           <a:prstGeom prst="curvedConnector3">
             <a:avLst>
@@ -4143,18 +4257,18 @@
           <p:cNvCxnSpPr>
             <a:cxnSpLocks/>
             <a:stCxn id="5" idx="1"/>
-            <a:endCxn id="164" idx="6"/>
+            <a:endCxn id="42" idx="6"/>
           </p:cNvCxnSpPr>
           <p:nvPr/>
         </p:nvCxnSpPr>
         <p:spPr>
           <a:xfrm rot="10800000">
-            <a:off x="3264232" y="1260354"/>
-            <a:ext cx="1864540" cy="4079408"/>
+            <a:off x="1991190" y="875027"/>
+            <a:ext cx="5998984" cy="1927926"/>
           </a:xfrm>
           <a:prstGeom prst="curvedConnector3">
             <a:avLst>
-              <a:gd name="adj1" fmla="val 61698"/>
+              <a:gd name="adj1" fmla="val 50000"/>
             </a:avLst>
           </a:prstGeom>
           <a:ln>
@@ -4187,20 +4301,18 @@
           </p:cNvPr>
           <p:cNvCxnSpPr>
             <a:cxnSpLocks/>
-            <a:stCxn id="5" idx="1"/>
+            <a:stCxn id="175" idx="3"/>
             <a:endCxn id="18" idx="3"/>
           </p:cNvCxnSpPr>
           <p:nvPr/>
         </p:nvCxnSpPr>
         <p:spPr>
-          <a:xfrm rot="10800000" flipV="1">
-            <a:off x="1455106" y="5339761"/>
-            <a:ext cx="3673666" cy="269575"/>
-          </a:xfrm>
-          <a:prstGeom prst="curvedConnector3">
-            <a:avLst>
-              <a:gd name="adj1" fmla="val 50000"/>
-            </a:avLst>
+          <a:xfrm rot="5400000">
+            <a:off x="6407614" y="5362376"/>
+            <a:ext cx="532569" cy="366538"/>
+          </a:xfrm>
+          <a:prstGeom prst="curvedConnector2">
+            <a:avLst/>
           </a:prstGeom>
           <a:ln>
             <a:tailEnd type="triangle"/>
@@ -4235,7 +4347,7 @@
         </p:nvSpPr>
         <p:spPr>
           <a:xfrm>
-            <a:off x="10974446" y="5349054"/>
+            <a:off x="2653527" y="5743590"/>
             <a:ext cx="1089327" cy="369134"/>
           </a:xfrm>
           <a:prstGeom prst="rect">
@@ -4291,7 +4403,7 @@
         </p:nvSpPr>
         <p:spPr>
           <a:xfrm>
-            <a:off x="214875" y="2654307"/>
+            <a:off x="206675" y="1961340"/>
             <a:ext cx="1240231" cy="486032"/>
           </a:xfrm>
           <a:prstGeom prst="rect">
@@ -4355,7 +4467,7 @@
         </p:nvSpPr>
         <p:spPr>
           <a:xfrm>
-            <a:off x="8627840" y="1282941"/>
+            <a:off x="2677950" y="3582841"/>
             <a:ext cx="2220939" cy="486032"/>
           </a:xfrm>
           <a:prstGeom prst="rect">
@@ -4436,7 +4548,7 @@
         </p:nvSpPr>
         <p:spPr>
           <a:xfrm>
-            <a:off x="8627840" y="2122643"/>
+            <a:off x="2737696" y="2707841"/>
             <a:ext cx="2220939" cy="486032"/>
           </a:xfrm>
           <a:prstGeom prst="rect">
@@ -4477,7 +4589,7 @@
             </a:br>
             <a:r>
               <a:rPr lang="en-GB" sz="1200" dirty="0" err="1"/>
-              <a:t>AppManifest</a:t>
+              <a:t>TestApp</a:t>
             </a:r>
             <a:endParaRPr lang="en-GB" sz="1200" dirty="0"/>
           </a:p>
@@ -4494,15 +4606,15 @@
           </p:cNvPr>
           <p:cNvCxnSpPr>
             <a:cxnSpLocks/>
-            <a:stCxn id="285" idx="2"/>
-            <a:endCxn id="286" idx="0"/>
+            <a:stCxn id="285" idx="0"/>
+            <a:endCxn id="286" idx="2"/>
           </p:cNvCxnSpPr>
           <p:nvPr/>
         </p:nvCxnSpPr>
         <p:spPr>
-          <a:xfrm rot="5400000">
-            <a:off x="9561475" y="1945808"/>
-            <a:ext cx="353670" cy="12700"/>
+          <a:xfrm rot="5400000" flipH="1" flipV="1">
+            <a:off x="3623809" y="3358484"/>
+            <a:ext cx="388968" cy="59746"/>
           </a:xfrm>
           <a:prstGeom prst="curvedConnector3">
             <a:avLst>
@@ -4542,7 +4654,7 @@
         </p:nvSpPr>
         <p:spPr>
           <a:xfrm>
-            <a:off x="9784109" y="1849517"/>
+            <a:off x="1916357" y="3255080"/>
             <a:ext cx="1878796" cy="253916"/>
           </a:xfrm>
           <a:prstGeom prst="rect">
@@ -4583,19 +4695,17 @@
           <p:cNvCxnSpPr>
             <a:cxnSpLocks/>
             <a:stCxn id="286" idx="1"/>
-            <a:endCxn id="164" idx="6"/>
+            <a:endCxn id="164" idx="4"/>
           </p:cNvCxnSpPr>
           <p:nvPr/>
         </p:nvCxnSpPr>
         <p:spPr>
           <a:xfrm rot="10800000">
-            <a:off x="3264232" y="1260355"/>
-            <a:ext cx="5363608" cy="1105305"/>
-          </a:xfrm>
-          <a:prstGeom prst="curvedConnector3">
-            <a:avLst>
-              <a:gd name="adj1" fmla="val 20283"/>
-            </a:avLst>
+            <a:off x="2461930" y="1611793"/>
+            <a:ext cx="275767" cy="1339064"/>
+          </a:xfrm>
+          <a:prstGeom prst="curvedConnector2">
+            <a:avLst/>
           </a:prstGeom>
           <a:ln>
             <a:tailEnd type="triangle"/>
@@ -4634,8 +4744,8 @@
         </p:nvCxnSpPr>
         <p:spPr>
           <a:xfrm rot="10800000" flipV="1">
-            <a:off x="1455107" y="1409729"/>
-            <a:ext cx="392969" cy="589373"/>
+            <a:off x="1455106" y="875027"/>
+            <a:ext cx="392970" cy="775540"/>
           </a:xfrm>
           <a:prstGeom prst="curvedConnector3">
             <a:avLst>
@@ -4675,8 +4785,8 @@
         </p:nvSpPr>
         <p:spPr>
           <a:xfrm>
-            <a:off x="5674315" y="4040893"/>
-            <a:ext cx="1129853" cy="486032"/>
+            <a:off x="7990175" y="1672200"/>
+            <a:ext cx="2204856" cy="486032"/>
           </a:xfrm>
           <a:prstGeom prst="rect">
             <a:avLst/>
@@ -4731,8 +4841,8 @@
         </p:nvSpPr>
         <p:spPr>
           <a:xfrm>
-            <a:off x="9154338" y="3103479"/>
-            <a:ext cx="1167942" cy="486032"/>
+            <a:off x="4942933" y="567338"/>
+            <a:ext cx="2204857" cy="486032"/>
           </a:xfrm>
           <a:prstGeom prst="rect">
             <a:avLst/>
@@ -4787,7 +4897,7 @@
         </p:nvSpPr>
         <p:spPr>
           <a:xfrm>
-            <a:off x="10974445" y="6266552"/>
+            <a:off x="1448004" y="6210044"/>
             <a:ext cx="1089327" cy="369134"/>
           </a:xfrm>
           <a:prstGeom prst="rect">
@@ -4840,13 +4950,14 @@
           </p:cNvPr>
           <p:cNvCxnSpPr>
             <a:cxnSpLocks/>
+            <a:endCxn id="377" idx="2"/>
           </p:cNvCxnSpPr>
           <p:nvPr/>
         </p:nvCxnSpPr>
         <p:spPr>
-          <a:xfrm rot="5400000" flipH="1" flipV="1">
-            <a:off x="5857857" y="4715362"/>
-            <a:ext cx="762768" cy="12700"/>
+          <a:xfrm rot="16200000" flipV="1">
+            <a:off x="8805361" y="2445474"/>
+            <a:ext cx="576176" cy="1692"/>
           </a:xfrm>
           <a:prstGeom prst="curvedConnector3">
             <a:avLst>
@@ -4883,15 +4994,15 @@
           </p:cNvPr>
           <p:cNvCxnSpPr>
             <a:cxnSpLocks/>
-            <a:stCxn id="377" idx="3"/>
-            <a:endCxn id="387" idx="1"/>
+            <a:stCxn id="377" idx="1"/>
+            <a:endCxn id="387" idx="3"/>
           </p:cNvCxnSpPr>
           <p:nvPr/>
         </p:nvCxnSpPr>
         <p:spPr>
-          <a:xfrm flipV="1">
-            <a:off x="6804168" y="3346495"/>
-            <a:ext cx="2350170" cy="937414"/>
+          <a:xfrm rot="10800000">
+            <a:off x="7147791" y="810354"/>
+            <a:ext cx="842385" cy="1104862"/>
           </a:xfrm>
           <a:prstGeom prst="curvedConnector3">
             <a:avLst>
@@ -4928,15 +5039,15 @@
           </p:cNvPr>
           <p:cNvCxnSpPr>
             <a:cxnSpLocks/>
-            <a:stCxn id="286" idx="2"/>
-            <a:endCxn id="387" idx="0"/>
+            <a:stCxn id="286" idx="0"/>
+            <a:endCxn id="387" idx="2"/>
           </p:cNvCxnSpPr>
           <p:nvPr/>
         </p:nvCxnSpPr>
         <p:spPr>
-          <a:xfrm rot="5400000">
-            <a:off x="9490908" y="2856077"/>
-            <a:ext cx="494804" cy="1"/>
+          <a:xfrm rot="5400000" flipH="1" flipV="1">
+            <a:off x="4119529" y="782008"/>
+            <a:ext cx="1654471" cy="2197196"/>
           </a:xfrm>
           <a:prstGeom prst="curvedConnector3">
             <a:avLst>
@@ -4973,20 +5084,18 @@
           </p:cNvPr>
           <p:cNvCxnSpPr>
             <a:cxnSpLocks/>
-            <a:stCxn id="5" idx="1"/>
+            <a:stCxn id="175" idx="4"/>
             <a:endCxn id="92" idx="3"/>
           </p:cNvCxnSpPr>
           <p:nvPr/>
         </p:nvCxnSpPr>
         <p:spPr>
-          <a:xfrm rot="10800000" flipV="1">
-            <a:off x="1455106" y="5339761"/>
-            <a:ext cx="3673666" cy="911051"/>
-          </a:xfrm>
-          <a:prstGeom prst="curvedConnector3">
-            <a:avLst>
-              <a:gd name="adj1" fmla="val 50000"/>
-            </a:avLst>
+          <a:xfrm rot="5400000">
+            <a:off x="6126037" y="5671677"/>
+            <a:ext cx="1146321" cy="417136"/>
+          </a:xfrm>
+          <a:prstGeom prst="curvedConnector2">
+            <a:avLst/>
           </a:prstGeom>
           <a:ln>
             <a:tailEnd type="triangle"/>
@@ -5021,7 +5130,7 @@
         </p:nvSpPr>
         <p:spPr>
           <a:xfrm>
-            <a:off x="1848075" y="1315075"/>
+            <a:off x="1848076" y="780372"/>
             <a:ext cx="143114" cy="189310"/>
           </a:xfrm>
           <a:prstGeom prst="ellipse">
@@ -5069,8 +5178,8 @@
         </p:nvCxnSpPr>
         <p:spPr>
           <a:xfrm rot="10800000">
-            <a:off x="1455107" y="586028"/>
-            <a:ext cx="392969" cy="823703"/>
+            <a:off x="1455106" y="479419"/>
+            <a:ext cx="392970" cy="395608"/>
           </a:xfrm>
           <a:prstGeom prst="curvedConnector3">
             <a:avLst>
@@ -5110,7 +5219,7 @@
         </p:nvSpPr>
         <p:spPr>
           <a:xfrm>
-            <a:off x="10938210" y="5009837"/>
+            <a:off x="1946623" y="5445127"/>
             <a:ext cx="177498" cy="189310"/>
           </a:xfrm>
           <a:prstGeom prst="ellipse">
@@ -5154,8 +5263,8 @@
         </p:nvSpPr>
         <p:spPr>
           <a:xfrm>
-            <a:off x="11127523" y="4890022"/>
-            <a:ext cx="943185" cy="415498"/>
+            <a:off x="2135936" y="5403217"/>
+            <a:ext cx="1587269" cy="253916"/>
           </a:xfrm>
           <a:prstGeom prst="rect">
             <a:avLst/>
@@ -5170,7 +5279,7 @@
           <a:p>
             <a:r>
               <a:rPr lang="en-GB" sz="1050" dirty="0"/>
-              <a:t>common dependencies</a:t>
+              <a:t>common  dependencies</a:t>
             </a:r>
           </a:p>
         </p:txBody>
@@ -5189,7 +5298,7 @@
         </p:nvSpPr>
         <p:spPr>
           <a:xfrm>
-            <a:off x="6324399" y="5687267"/>
+            <a:off x="9185801" y="3150458"/>
             <a:ext cx="718919" cy="253916"/>
           </a:xfrm>
           <a:prstGeom prst="rect">
@@ -5212,71 +5321,10 @@
       </p:sp>
       <p:sp>
         <p:nvSpPr>
-          <p:cNvPr id="123" name="Rectangle 122">
-            <a:extLst>
-              <a:ext uri="{FF2B5EF4-FFF2-40B4-BE49-F238E27FC236}">
-                <a16:creationId xmlns:a16="http://schemas.microsoft.com/office/drawing/2014/main" id="{7CA212B5-D148-4CEA-B3C2-FB7FAA771FBD}"/>
-              </a:ext>
-            </a:extLst>
-          </p:cNvPr>
-          <p:cNvSpPr/>
-          <p:nvPr/>
-        </p:nvSpPr>
-        <p:spPr>
-          <a:xfrm>
-            <a:off x="214875" y="3815608"/>
-            <a:ext cx="1240231" cy="486032"/>
-          </a:xfrm>
-          <a:prstGeom prst="rect">
-            <a:avLst/>
-          </a:prstGeom>
-          <a:solidFill>
-            <a:srgbClr val="70AD47">
-              <a:alpha val="45098"/>
-            </a:srgbClr>
-          </a:solidFill>
-        </p:spPr>
-        <p:style>
-          <a:lnRef idx="2">
-            <a:schemeClr val="accent1">
-              <a:shade val="50000"/>
-            </a:schemeClr>
-          </a:lnRef>
-          <a:fillRef idx="1">
-            <a:schemeClr val="accent1"/>
-          </a:fillRef>
-          <a:effectRef idx="0">
-            <a:schemeClr val="accent1"/>
-          </a:effectRef>
-          <a:fontRef idx="minor">
-            <a:schemeClr val="lt1"/>
-          </a:fontRef>
-        </p:style>
-        <p:txBody>
-          <a:bodyPr rtlCol="0" anchor="ctr"/>
-          <a:lstStyle/>
-          <a:p>
-            <a:pPr algn="ctr"/>
-            <a:r>
-              <a:rPr lang="en-GB" sz="1200" dirty="0"/>
-              <a:t>Security</a:t>
-            </a:r>
-            <a:br>
-              <a:rPr lang="en-GB" sz="1200" dirty="0"/>
-            </a:br>
-            <a:r>
-              <a:rPr lang="en-GB" sz="1200" dirty="0"/>
-              <a:t>Keycloak</a:t>
-            </a:r>
-          </a:p>
-        </p:txBody>
-      </p:sp>
-      <p:sp>
-        <p:nvSpPr>
-          <p:cNvPr id="71" name="TextBox 70">
-            <a:extLst>
-              <a:ext uri="{FF2B5EF4-FFF2-40B4-BE49-F238E27FC236}">
-                <a16:creationId xmlns:a16="http://schemas.microsoft.com/office/drawing/2014/main" id="{9468C3BA-1104-4FAF-B227-156B513C306D}"/>
+          <p:cNvPr id="2" name="TextBox 1">
+            <a:extLst>
+              <a:ext uri="{FF2B5EF4-FFF2-40B4-BE49-F238E27FC236}">
+                <a16:creationId xmlns:a16="http://schemas.microsoft.com/office/drawing/2014/main" id="{F2FE4EC6-A964-40FD-9686-116AD5FEDF4E}"/>
               </a:ext>
             </a:extLst>
           </p:cNvPr>
@@ -5284,9 +5332,9 @@
           <p:nvPr/>
         </p:nvSpPr>
         <p:spPr>
-          <a:xfrm>
-            <a:off x="30628" y="4310671"/>
-            <a:ext cx="1617328" cy="253916"/>
+          <a:xfrm flipH="1">
+            <a:off x="8953616" y="35401"/>
+            <a:ext cx="3203888" cy="646331"/>
           </a:xfrm>
           <a:prstGeom prst="rect">
             <a:avLst/>
@@ -5301,42 +5349,6 @@
           <a:p>
             <a:pPr algn="ctr"/>
             <a:r>
-              <a:rPr lang="en-GB" sz="1050" dirty="0"/>
-              <a:t>(not used in this app)</a:t>
-            </a:r>
-          </a:p>
-        </p:txBody>
-      </p:sp>
-      <p:sp>
-        <p:nvSpPr>
-          <p:cNvPr id="2" name="TextBox 1">
-            <a:extLst>
-              <a:ext uri="{FF2B5EF4-FFF2-40B4-BE49-F238E27FC236}">
-                <a16:creationId xmlns:a16="http://schemas.microsoft.com/office/drawing/2014/main" id="{F2FE4EC6-A964-40FD-9686-116AD5FEDF4E}"/>
-              </a:ext>
-            </a:extLst>
-          </p:cNvPr>
-          <p:cNvSpPr txBox="1"/>
-          <p:nvPr/>
-        </p:nvSpPr>
-        <p:spPr>
-          <a:xfrm flipH="1">
-            <a:off x="8814058" y="80004"/>
-            <a:ext cx="3203888" cy="646331"/>
-          </a:xfrm>
-          <a:prstGeom prst="rect">
-            <a:avLst/>
-          </a:prstGeom>
-          <a:noFill/>
-        </p:spPr>
-        <p:txBody>
-          <a:bodyPr wrap="square" rtlCol="0">
-            <a:spAutoFit/>
-          </a:bodyPr>
-          <a:lstStyle/>
-          <a:p>
-            <a:pPr algn="ctr"/>
-            <a:r>
               <a:rPr lang="en-GB" dirty="0"/>
               <a:t>Application dependencies of</a:t>
             </a:r>
@@ -5368,7 +5380,7 @@
         </p:nvSpPr>
         <p:spPr>
           <a:xfrm>
-            <a:off x="10974445" y="5807803"/>
+            <a:off x="2653526" y="6202339"/>
             <a:ext cx="1089327" cy="369134"/>
           </a:xfrm>
           <a:prstGeom prst="rect">
@@ -5428,7 +5440,7 @@
         </p:nvSpPr>
         <p:spPr>
           <a:xfrm>
-            <a:off x="214875" y="343011"/>
+            <a:off x="214875" y="236403"/>
             <a:ext cx="1240231" cy="486032"/>
           </a:xfrm>
           <a:prstGeom prst="rect">
@@ -5480,7 +5492,7 @@
         </p:nvSpPr>
         <p:spPr>
           <a:xfrm>
-            <a:off x="214875" y="6007797"/>
+            <a:off x="5250398" y="6210390"/>
             <a:ext cx="1240231" cy="486032"/>
           </a:xfrm>
           <a:prstGeom prst="rect">
@@ -5532,7 +5544,7 @@
         </p:nvSpPr>
         <p:spPr>
           <a:xfrm>
-            <a:off x="9756891" y="5349054"/>
+            <a:off x="1451636" y="5765144"/>
             <a:ext cx="1089327" cy="369134"/>
           </a:xfrm>
           <a:prstGeom prst="rect">
@@ -5588,7 +5600,7 @@
         </p:nvSpPr>
         <p:spPr>
           <a:xfrm>
-            <a:off x="9756891" y="5807803"/>
+            <a:off x="230450" y="5751295"/>
             <a:ext cx="1089327" cy="369134"/>
           </a:xfrm>
           <a:prstGeom prst="rect">
@@ -5647,7 +5659,7 @@
         </p:nvSpPr>
         <p:spPr>
           <a:xfrm>
-            <a:off x="9756891" y="6266552"/>
+            <a:off x="230450" y="6210044"/>
             <a:ext cx="1089327" cy="369134"/>
           </a:xfrm>
           <a:prstGeom prst="rect">
@@ -5706,7 +5718,7 @@
         </p:nvSpPr>
         <p:spPr>
           <a:xfrm>
-            <a:off x="5128772" y="2254305"/>
+            <a:off x="9760550" y="5488988"/>
             <a:ext cx="2220939" cy="486032"/>
           </a:xfrm>
           <a:prstGeom prst="rect">
@@ -5740,15 +5752,7 @@
                   <a:schemeClr val="tx1"/>
                 </a:solidFill>
               </a:rPr>
-              <a:t>@</a:t>
-            </a:r>
-            <a:r>
-              <a:rPr lang="en-GB" sz="1200" dirty="0" err="1">
-                <a:solidFill>
-                  <a:schemeClr val="tx1"/>
-                </a:solidFill>
-              </a:rPr>
-              <a:t>SpringBootTest</a:t>
+              <a:t>@SpringBootTest</a:t>
             </a:r>
             <a:br>
               <a:rPr lang="en-GB" sz="1200" dirty="0">
@@ -5763,7 +5767,7 @@
                   <a:schemeClr val="tx1"/>
                 </a:solidFill>
               </a:rPr>
-              <a:t>ApplicationntegTestAbstract</a:t>
+              <a:t>WebAppIntegTestAbstract</a:t>
             </a:r>
             <a:endParaRPr lang="en-GB" sz="1200" dirty="0">
               <a:solidFill>
@@ -5787,7 +5791,7 @@
         </p:nvSpPr>
         <p:spPr>
           <a:xfrm>
-            <a:off x="5128772" y="3144341"/>
+            <a:off x="9719715" y="4716326"/>
             <a:ext cx="2220939" cy="486032"/>
           </a:xfrm>
           <a:prstGeom prst="rect">
@@ -5817,7 +5821,7 @@
             <a:pPr algn="ctr"/>
             <a:r>
               <a:rPr lang="en-GB" sz="1200" dirty="0" err="1"/>
-              <a:t>ApplicationIntegTestAbstract</a:t>
+              <a:t>WebAppntegTestAbstract</a:t>
             </a:r>
             <a:r>
               <a:rPr lang="en-GB" sz="1200" dirty="0"/>
@@ -5828,7 +5832,7 @@
             </a:br>
             <a:r>
               <a:rPr lang="en-GB" sz="1200" dirty="0" err="1"/>
-              <a:t>AppManifest</a:t>
+              <a:t>TestApp</a:t>
             </a:r>
             <a:endParaRPr lang="en-GB" sz="1200" dirty="0"/>
           </a:p>
@@ -5845,13 +5849,15 @@
           </p:cNvPr>
           <p:cNvCxnSpPr>
             <a:cxnSpLocks/>
+            <a:stCxn id="117" idx="0"/>
+            <a:endCxn id="118" idx="2"/>
           </p:cNvCxnSpPr>
           <p:nvPr/>
         </p:nvCxnSpPr>
         <p:spPr>
-          <a:xfrm rot="5400000">
-            <a:off x="6037239" y="2942339"/>
-            <a:ext cx="404004" cy="12700"/>
+          <a:xfrm rot="16200000" flipV="1">
+            <a:off x="10707288" y="5325255"/>
+            <a:ext cx="286630" cy="40835"/>
           </a:xfrm>
           <a:prstGeom prst="curvedConnector3">
             <a:avLst>
@@ -5891,7 +5897,7 @@
         </p:nvSpPr>
         <p:spPr>
           <a:xfrm>
-            <a:off x="6196624" y="2779031"/>
+            <a:off x="12439507" y="5388560"/>
             <a:ext cx="1878796" cy="253916"/>
           </a:xfrm>
           <a:prstGeom prst="rect">
@@ -5931,18 +5937,18 @@
           </p:cNvPr>
           <p:cNvCxnSpPr>
             <a:cxnSpLocks/>
+            <a:stCxn id="118" idx="0"/>
+            <a:endCxn id="377" idx="3"/>
           </p:cNvCxnSpPr>
           <p:nvPr/>
         </p:nvCxnSpPr>
         <p:spPr>
-          <a:xfrm rot="5400000">
-            <a:off x="6033981" y="3835633"/>
-            <a:ext cx="410520" cy="12700"/>
-          </a:xfrm>
-          <a:prstGeom prst="curvedConnector3">
-            <a:avLst>
-              <a:gd name="adj1" fmla="val 50000"/>
-            </a:avLst>
+          <a:xfrm rot="16200000" flipV="1">
+            <a:off x="9112053" y="2998194"/>
+            <a:ext cx="2801110" cy="635154"/>
+          </a:xfrm>
+          <a:prstGeom prst="curvedConnector2">
+            <a:avLst/>
           </a:prstGeom>
           <a:ln>
             <a:tailEnd type="triangle"/>
@@ -5981,12 +5987,12 @@
         </p:nvCxnSpPr>
         <p:spPr>
           <a:xfrm rot="10800000">
-            <a:off x="3264232" y="1260355"/>
-            <a:ext cx="1864540" cy="2127003"/>
+            <a:off x="2533487" y="1517138"/>
+            <a:ext cx="7186229" cy="3442204"/>
           </a:xfrm>
           <a:prstGeom prst="curvedConnector3">
             <a:avLst>
-              <a:gd name="adj1" fmla="val 50000"/>
+              <a:gd name="adj1" fmla="val 57018"/>
             </a:avLst>
           </a:prstGeom>
           <a:ln>
@@ -6022,7 +6028,7 @@
         </p:nvSpPr>
         <p:spPr>
           <a:xfrm>
-            <a:off x="3121118" y="1165699"/>
+            <a:off x="2390372" y="1422483"/>
             <a:ext cx="143114" cy="189310"/>
           </a:xfrm>
           <a:prstGeom prst="ellipse">
@@ -6069,9 +6075,9 @@
           <p:nvPr/>
         </p:nvCxnSpPr>
         <p:spPr>
-          <a:xfrm rot="10800000" flipV="1">
-            <a:off x="1991190" y="1260354"/>
-            <a:ext cx="1129929" cy="149376"/>
+          <a:xfrm rot="10800000">
+            <a:off x="1991190" y="875028"/>
+            <a:ext cx="399182" cy="642111"/>
           </a:xfrm>
           <a:prstGeom prst="curvedConnector3">
             <a:avLst>
@@ -6115,8 +6121,8 @@
         </p:nvCxnSpPr>
         <p:spPr>
           <a:xfrm rot="10800000" flipV="1">
-            <a:off x="1455106" y="1260353"/>
-            <a:ext cx="1666012" cy="1636969"/>
+            <a:off x="1446906" y="1517138"/>
+            <a:ext cx="943466" cy="687218"/>
           </a:xfrm>
           <a:prstGeom prst="curvedConnector3">
             <a:avLst>
@@ -6156,7 +6162,7 @@
         </p:nvSpPr>
         <p:spPr>
           <a:xfrm>
-            <a:off x="7515095" y="6345754"/>
+            <a:off x="8562356" y="1131116"/>
             <a:ext cx="1878796" cy="307777"/>
           </a:xfrm>
           <a:prstGeom prst="rect">
@@ -6170,6 +6176,7 @@
           </a:bodyPr>
           <a:lstStyle/>
           <a:p>
+            <a:pPr algn="r"/>
             <a:r>
               <a:rPr lang="en-GB" sz="1400" b="1" dirty="0" err="1"/>
               <a:t>webapp</a:t>
@@ -6192,8 +6199,8 @@
         </p:nvSpPr>
         <p:spPr>
           <a:xfrm>
-            <a:off x="9683901" y="3813737"/>
-            <a:ext cx="1339233" cy="307777"/>
+            <a:off x="2473782" y="4142790"/>
+            <a:ext cx="1790982" cy="307777"/>
           </a:xfrm>
           <a:prstGeom prst="rect">
             <a:avLst/>
@@ -6209,7 +6216,7 @@
             <a:pPr algn="ctr"/>
             <a:r>
               <a:rPr lang="en-GB" sz="1400" b="1" dirty="0"/>
-              <a:t>module-simple</a:t>
+              <a:t>module-simple-tests</a:t>
             </a:r>
           </a:p>
         </p:txBody>
@@ -6228,7 +6235,7 @@
         </p:nvSpPr>
         <p:spPr>
           <a:xfrm>
-            <a:off x="7743645" y="3981301"/>
+            <a:off x="9299759" y="2194676"/>
             <a:ext cx="718919" cy="253916"/>
           </a:xfrm>
           <a:prstGeom prst="rect">
@@ -6251,10 +6258,10 @@
       </p:sp>
       <p:sp>
         <p:nvSpPr>
-          <p:cNvPr id="223" name="TextBox 222">
-            <a:extLst>
-              <a:ext uri="{FF2B5EF4-FFF2-40B4-BE49-F238E27FC236}">
-                <a16:creationId xmlns:a16="http://schemas.microsoft.com/office/drawing/2014/main" id="{4EDF00E2-3E51-43F2-9E7B-7E6D9636C82F}"/>
+          <p:cNvPr id="224" name="TextBox 223">
+            <a:extLst>
+              <a:ext uri="{FF2B5EF4-FFF2-40B4-BE49-F238E27FC236}">
+                <a16:creationId xmlns:a16="http://schemas.microsoft.com/office/drawing/2014/main" id="{FBB66AF5-4CF2-4E7A-B56B-AF7015DDE877}"/>
               </a:ext>
             </a:extLst>
           </p:cNvPr>
@@ -6263,7 +6270,7 @@
         </p:nvSpPr>
         <p:spPr>
           <a:xfrm>
-            <a:off x="6254511" y="3706167"/>
+            <a:off x="7482796" y="831732"/>
             <a:ext cx="718919" cy="253916"/>
           </a:xfrm>
           <a:prstGeom prst="rect">
@@ -6286,10 +6293,10 @@
       </p:sp>
       <p:sp>
         <p:nvSpPr>
-          <p:cNvPr id="224" name="TextBox 223">
-            <a:extLst>
-              <a:ext uri="{FF2B5EF4-FFF2-40B4-BE49-F238E27FC236}">
-                <a16:creationId xmlns:a16="http://schemas.microsoft.com/office/drawing/2014/main" id="{FBB66AF5-4CF2-4E7A-B56B-AF7015DDE877}"/>
+          <p:cNvPr id="73" name="TextBox 72">
+            <a:extLst>
+              <a:ext uri="{FF2B5EF4-FFF2-40B4-BE49-F238E27FC236}">
+                <a16:creationId xmlns:a16="http://schemas.microsoft.com/office/drawing/2014/main" id="{D730312B-ACC1-46BB-9157-CBF5175ACCC5}"/>
               </a:ext>
             </a:extLst>
           </p:cNvPr>
@@ -6298,8 +6305,8 @@
         </p:nvSpPr>
         <p:spPr>
           <a:xfrm>
-            <a:off x="9787517" y="2752600"/>
-            <a:ext cx="718919" cy="253916"/>
+            <a:off x="5559445" y="167851"/>
+            <a:ext cx="1790982" cy="307777"/>
           </a:xfrm>
           <a:prstGeom prst="rect">
             <a:avLst/>
@@ -6312,9 +6319,177 @@
           </a:bodyPr>
           <a:lstStyle/>
           <a:p>
+            <a:pPr algn="r"/>
+            <a:r>
+              <a:rPr lang="en-GB" sz="1400" b="1" dirty="0"/>
+              <a:t>module-simple</a:t>
+            </a:r>
+          </a:p>
+        </p:txBody>
+      </p:sp>
+      <p:sp>
+        <p:nvSpPr>
+          <p:cNvPr id="158" name="TextBox 157">
+            <a:extLst>
+              <a:ext uri="{FF2B5EF4-FFF2-40B4-BE49-F238E27FC236}">
+                <a16:creationId xmlns:a16="http://schemas.microsoft.com/office/drawing/2014/main" id="{DCC5EFA3-A1B7-4674-B75D-ABD5DB464B90}"/>
+              </a:ext>
+            </a:extLst>
+          </p:cNvPr>
+          <p:cNvSpPr txBox="1"/>
+          <p:nvPr/>
+        </p:nvSpPr>
+        <p:spPr>
+          <a:xfrm>
+            <a:off x="9501453" y="6120429"/>
+            <a:ext cx="1878796" cy="307777"/>
+          </a:xfrm>
+          <a:prstGeom prst="rect">
+            <a:avLst/>
+          </a:prstGeom>
+          <a:noFill/>
+        </p:spPr>
+        <p:txBody>
+          <a:bodyPr wrap="square" rtlCol="0">
+            <a:spAutoFit/>
+          </a:bodyPr>
+          <a:lstStyle/>
+          <a:p>
+            <a:r>
+              <a:rPr lang="en-GB" sz="1400" b="1" dirty="0"/>
+              <a:t>webapp-tests</a:t>
+            </a:r>
+          </a:p>
+        </p:txBody>
+      </p:sp>
+      <p:sp>
+        <p:nvSpPr>
+          <p:cNvPr id="175" name="Oval 174">
+            <a:extLst>
+              <a:ext uri="{FF2B5EF4-FFF2-40B4-BE49-F238E27FC236}">
+                <a16:creationId xmlns:a16="http://schemas.microsoft.com/office/drawing/2014/main" id="{6C120CC4-7443-4801-9F93-4FA4C0478D7C}"/>
+              </a:ext>
+            </a:extLst>
+          </p:cNvPr>
+          <p:cNvSpPr/>
+          <p:nvPr/>
+        </p:nvSpPr>
+        <p:spPr>
+          <a:xfrm>
+            <a:off x="6836208" y="5117775"/>
+            <a:ext cx="143114" cy="189310"/>
+          </a:xfrm>
+          <a:prstGeom prst="ellipse">
+            <a:avLst/>
+          </a:prstGeom>
+        </p:spPr>
+        <p:style>
+          <a:lnRef idx="2">
+            <a:schemeClr val="accent6"/>
+          </a:lnRef>
+          <a:fillRef idx="1">
+            <a:schemeClr val="lt1"/>
+          </a:fillRef>
+          <a:effectRef idx="0">
+            <a:schemeClr val="accent6"/>
+          </a:effectRef>
+          <a:fontRef idx="minor">
+            <a:schemeClr val="dk1"/>
+          </a:fontRef>
+        </p:style>
+        <p:txBody>
+          <a:bodyPr rtlCol="0" anchor="ctr"/>
+          <a:lstStyle/>
+          <a:p>
+            <a:pPr algn="ctr"/>
+            <a:endParaRPr lang="en-GB"/>
+          </a:p>
+        </p:txBody>
+      </p:sp>
+      <p:cxnSp>
+        <p:nvCxnSpPr>
+          <p:cNvPr id="180" name="Connector: Curved 179">
+            <a:extLst>
+              <a:ext uri="{FF2B5EF4-FFF2-40B4-BE49-F238E27FC236}">
+                <a16:creationId xmlns:a16="http://schemas.microsoft.com/office/drawing/2014/main" id="{6DDB4BAD-7352-4133-BACC-817E24A55C08}"/>
+              </a:ext>
+            </a:extLst>
+          </p:cNvPr>
+          <p:cNvCxnSpPr>
+            <a:cxnSpLocks/>
+            <a:stCxn id="175" idx="2"/>
+            <a:endCxn id="17" idx="3"/>
+          </p:cNvCxnSpPr>
+          <p:nvPr/>
+        </p:nvCxnSpPr>
+        <p:spPr>
+          <a:xfrm rot="10800000">
+            <a:off x="6490630" y="5212430"/>
+            <a:ext cx="345579" cy="12700"/>
+          </a:xfrm>
+          <a:prstGeom prst="curvedConnector3">
+            <a:avLst>
+              <a:gd name="adj1" fmla="val 50000"/>
+            </a:avLst>
+          </a:prstGeom>
+          <a:ln>
+            <a:tailEnd type="triangle"/>
+          </a:ln>
+        </p:spPr>
+        <p:style>
+          <a:lnRef idx="1">
+            <a:schemeClr val="accent1"/>
+          </a:lnRef>
+          <a:fillRef idx="0">
+            <a:schemeClr val="accent1"/>
+          </a:fillRef>
+          <a:effectRef idx="0">
+            <a:schemeClr val="accent1"/>
+          </a:effectRef>
+          <a:fontRef idx="minor">
+            <a:schemeClr val="tx1"/>
+          </a:fontRef>
+        </p:style>
+      </p:cxnSp>
+      <p:sp>
+        <p:nvSpPr>
+          <p:cNvPr id="206" name="TextBox 205">
+            <a:extLst>
+              <a:ext uri="{FF2B5EF4-FFF2-40B4-BE49-F238E27FC236}">
+                <a16:creationId xmlns:a16="http://schemas.microsoft.com/office/drawing/2014/main" id="{B34794B2-EE4F-4C59-9227-60792B9CCAE1}"/>
+              </a:ext>
+            </a:extLst>
+          </p:cNvPr>
+          <p:cNvSpPr txBox="1"/>
+          <p:nvPr/>
+        </p:nvSpPr>
+        <p:spPr>
+          <a:xfrm>
+            <a:off x="9079280" y="5202356"/>
+            <a:ext cx="1878796" cy="253916"/>
+          </a:xfrm>
+          <a:prstGeom prst="rect">
+            <a:avLst/>
+          </a:prstGeom>
+          <a:noFill/>
+        </p:spPr>
+        <p:txBody>
+          <a:bodyPr wrap="square" rtlCol="0">
+            <a:spAutoFit/>
+          </a:bodyPr>
+          <a:lstStyle/>
+          <a:p>
             <a:r>
               <a:rPr lang="en-GB" sz="1050" dirty="0"/>
-              <a:t>@Import</a:t>
+              <a:t>@</a:t>
+            </a:r>
+            <a:r>
+              <a:rPr lang="en-GB" sz="1050" dirty="0" err="1"/>
+              <a:t>SpringBootTest</a:t>
+            </a:r>
+            <a:r>
+              <a:rPr lang="en-GB" sz="1050" dirty="0"/>
+              <a:t>(classes=…)</a:t>
             </a:r>
           </a:p>
         </p:txBody>

</xml_diff>